<commit_message>
layout pass for part 3
</commit_message>
<xml_diff>
--- a/images/measurement/src/measurement_figs.pptx
+++ b/images/measurement/src/measurement_figs.pptx
@@ -3404,7 +3404,7 @@
           <a:p>
             <a:fld id="{4BE83899-E222-4147-BECF-BE0E769C33DC}" type="datetimeFigureOut">
               <a:rPr lang="en-US" smtClean="0"/>
-              <a:t>12/19/23</a:t>
+              <a:t>2/10/25</a:t>
             </a:fld>
             <a:endParaRPr lang="en-US"/>
           </a:p>
@@ -3602,7 +3602,7 @@
           <a:p>
             <a:fld id="{4BE83899-E222-4147-BECF-BE0E769C33DC}" type="datetimeFigureOut">
               <a:rPr lang="en-US" smtClean="0"/>
-              <a:t>12/19/23</a:t>
+              <a:t>2/10/25</a:t>
             </a:fld>
             <a:endParaRPr lang="en-US"/>
           </a:p>
@@ -3810,7 +3810,7 @@
           <a:p>
             <a:fld id="{4BE83899-E222-4147-BECF-BE0E769C33DC}" type="datetimeFigureOut">
               <a:rPr lang="en-US" smtClean="0"/>
-              <a:t>12/19/23</a:t>
+              <a:t>2/10/25</a:t>
             </a:fld>
             <a:endParaRPr lang="en-US"/>
           </a:p>
@@ -4008,7 +4008,7 @@
           <a:p>
             <a:fld id="{4BE83899-E222-4147-BECF-BE0E769C33DC}" type="datetimeFigureOut">
               <a:rPr lang="en-US" smtClean="0"/>
-              <a:t>12/19/23</a:t>
+              <a:t>2/10/25</a:t>
             </a:fld>
             <a:endParaRPr lang="en-US"/>
           </a:p>
@@ -4283,7 +4283,7 @@
           <a:p>
             <a:fld id="{4BE83899-E222-4147-BECF-BE0E769C33DC}" type="datetimeFigureOut">
               <a:rPr lang="en-US" smtClean="0"/>
-              <a:t>12/19/23</a:t>
+              <a:t>2/10/25</a:t>
             </a:fld>
             <a:endParaRPr lang="en-US"/>
           </a:p>
@@ -4548,7 +4548,7 @@
           <a:p>
             <a:fld id="{4BE83899-E222-4147-BECF-BE0E769C33DC}" type="datetimeFigureOut">
               <a:rPr lang="en-US" smtClean="0"/>
-              <a:t>12/19/23</a:t>
+              <a:t>2/10/25</a:t>
             </a:fld>
             <a:endParaRPr lang="en-US"/>
           </a:p>
@@ -4960,7 +4960,7 @@
           <a:p>
             <a:fld id="{4BE83899-E222-4147-BECF-BE0E769C33DC}" type="datetimeFigureOut">
               <a:rPr lang="en-US" smtClean="0"/>
-              <a:t>12/19/23</a:t>
+              <a:t>2/10/25</a:t>
             </a:fld>
             <a:endParaRPr lang="en-US"/>
           </a:p>
@@ -5101,7 +5101,7 @@
           <a:p>
             <a:fld id="{4BE83899-E222-4147-BECF-BE0E769C33DC}" type="datetimeFigureOut">
               <a:rPr lang="en-US" smtClean="0"/>
-              <a:t>12/19/23</a:t>
+              <a:t>2/10/25</a:t>
             </a:fld>
             <a:endParaRPr lang="en-US"/>
           </a:p>
@@ -5214,7 +5214,7 @@
           <a:p>
             <a:fld id="{4BE83899-E222-4147-BECF-BE0E769C33DC}" type="datetimeFigureOut">
               <a:rPr lang="en-US" smtClean="0"/>
-              <a:t>12/19/23</a:t>
+              <a:t>2/10/25</a:t>
             </a:fld>
             <a:endParaRPr lang="en-US"/>
           </a:p>
@@ -5525,7 +5525,7 @@
           <a:p>
             <a:fld id="{4BE83899-E222-4147-BECF-BE0E769C33DC}" type="datetimeFigureOut">
               <a:rPr lang="en-US" smtClean="0"/>
-              <a:t>12/19/23</a:t>
+              <a:t>2/10/25</a:t>
             </a:fld>
             <a:endParaRPr lang="en-US"/>
           </a:p>
@@ -5813,7 +5813,7 @@
           <a:p>
             <a:fld id="{4BE83899-E222-4147-BECF-BE0E769C33DC}" type="datetimeFigureOut">
               <a:rPr lang="en-US" smtClean="0"/>
-              <a:t>12/19/23</a:t>
+              <a:t>2/10/25</a:t>
             </a:fld>
             <a:endParaRPr lang="en-US"/>
           </a:p>
@@ -6054,7 +6054,7 @@
           <a:p>
             <a:fld id="{4BE83899-E222-4147-BECF-BE0E769C33DC}" type="datetimeFigureOut">
               <a:rPr lang="en-US" smtClean="0"/>
-              <a:t>12/19/23</a:t>
+              <a:t>2/10/25</a:t>
             </a:fld>
             <a:endParaRPr lang="en-US"/>
           </a:p>
@@ -6671,7 +6671,7 @@
           <p:nvPr/>
         </p:nvPicPr>
         <p:blipFill>
-          <a:blip r:embed="rId3"/>
+          <a:blip r:embed="rId2"/>
           <a:stretch>
             <a:fillRect/>
           </a:stretch>
@@ -6880,7 +6880,7 @@
           </p:grpSpPr>
           <mc:AlternateContent xmlns:mc="http://schemas.openxmlformats.org/markup-compatibility/2006" xmlns:p14="http://schemas.microsoft.com/office/powerpoint/2010/main">
             <mc:Choice Requires="p14">
-              <p:contentPart p14:bwMode="auto" r:id="rId4">
+              <p:contentPart p14:bwMode="auto" r:id="rId3">
                 <p14:nvContentPartPr>
                   <p14:cNvPr id="12" name="Ink 11">
                     <a:extLst>
@@ -7083,8 +7083,8 @@
             </mc:Fallback>
           </mc:AlternateContent>
         </p:grpSp>
-        <mc:AlternateContent xmlns:mc="http://schemas.openxmlformats.org/markup-compatibility/2006">
-          <mc:Choice xmlns:p14="http://schemas.microsoft.com/office/powerpoint/2010/main" Requires="p14">
+        <mc:AlternateContent xmlns:mc="http://schemas.openxmlformats.org/markup-compatibility/2006" xmlns:p14="http://schemas.microsoft.com/office/powerpoint/2010/main">
+          <mc:Choice Requires="p14">
             <p:contentPart p14:bwMode="auto" r:id="rId12">
               <p14:nvContentPartPr>
                 <p14:cNvPr id="27" name="Ink 26">
@@ -7103,7 +7103,7 @@
               </p14:xfrm>
             </p:contentPart>
           </mc:Choice>
-          <mc:Fallback>
+          <mc:Fallback xmlns="">
             <p:pic>
               <p:nvPicPr>
                 <p:cNvPr id="27" name="Ink 26">
@@ -7134,8 +7134,8 @@
             </p:pic>
           </mc:Fallback>
         </mc:AlternateContent>
-        <mc:AlternateContent xmlns:mc="http://schemas.openxmlformats.org/markup-compatibility/2006">
-          <mc:Choice xmlns:p14="http://schemas.microsoft.com/office/powerpoint/2010/main" Requires="p14">
+        <mc:AlternateContent xmlns:mc="http://schemas.openxmlformats.org/markup-compatibility/2006" xmlns:p14="http://schemas.microsoft.com/office/powerpoint/2010/main">
+          <mc:Choice Requires="p14">
             <p:contentPart p14:bwMode="auto" r:id="rId14">
               <p14:nvContentPartPr>
                 <p14:cNvPr id="29" name="Ink 28">
@@ -7154,7 +7154,7 @@
               </p14:xfrm>
             </p:contentPart>
           </mc:Choice>
-          <mc:Fallback>
+          <mc:Fallback xmlns="">
             <p:pic>
               <p:nvPicPr>
                 <p:cNvPr id="29" name="Ink 28">
@@ -7431,8 +7431,8 @@
             </mc:Fallback>
           </mc:AlternateContent>
         </p:grpSp>
-        <mc:AlternateContent xmlns:mc="http://schemas.openxmlformats.org/markup-compatibility/2006">
-          <mc:Choice xmlns:p14="http://schemas.microsoft.com/office/powerpoint/2010/main" Requires="p14">
+        <mc:AlternateContent xmlns:mc="http://schemas.openxmlformats.org/markup-compatibility/2006" xmlns:p14="http://schemas.microsoft.com/office/powerpoint/2010/main">
+          <mc:Choice Requires="p14">
             <p:contentPart p14:bwMode="auto" r:id="rId20">
               <p14:nvContentPartPr>
                 <p14:cNvPr id="33" name="Ink 32">
@@ -7451,7 +7451,7 @@
               </p14:xfrm>
             </p:contentPart>
           </mc:Choice>
-          <mc:Fallback>
+          <mc:Fallback xmlns="">
             <p:pic>
               <p:nvPicPr>
                 <p:cNvPr id="33" name="Ink 32">
@@ -7482,8 +7482,8 @@
             </p:pic>
           </mc:Fallback>
         </mc:AlternateContent>
-        <mc:AlternateContent xmlns:mc="http://schemas.openxmlformats.org/markup-compatibility/2006">
-          <mc:Choice xmlns:p14="http://schemas.microsoft.com/office/powerpoint/2010/main" Requires="p14">
+        <mc:AlternateContent xmlns:mc="http://schemas.openxmlformats.org/markup-compatibility/2006" xmlns:p14="http://schemas.microsoft.com/office/powerpoint/2010/main">
+          <mc:Choice Requires="p14">
             <p:contentPart p14:bwMode="auto" r:id="rId21">
               <p14:nvContentPartPr>
                 <p14:cNvPr id="34" name="Ink 33">
@@ -7502,7 +7502,7 @@
               </p14:xfrm>
             </p:contentPart>
           </mc:Choice>
-          <mc:Fallback>
+          <mc:Fallback xmlns="">
             <p:pic>
               <p:nvPicPr>
                 <p:cNvPr id="34" name="Ink 33">
@@ -7779,8 +7779,8 @@
             </mc:Fallback>
           </mc:AlternateContent>
         </p:grpSp>
-        <mc:AlternateContent xmlns:mc="http://schemas.openxmlformats.org/markup-compatibility/2006">
-          <mc:Choice xmlns:p14="http://schemas.microsoft.com/office/powerpoint/2010/main" Requires="p14">
+        <mc:AlternateContent xmlns:mc="http://schemas.openxmlformats.org/markup-compatibility/2006" xmlns:p14="http://schemas.microsoft.com/office/powerpoint/2010/main">
+          <mc:Choice Requires="p14">
             <p:contentPart p14:bwMode="auto" r:id="rId26">
               <p14:nvContentPartPr>
                 <p14:cNvPr id="41" name="Ink 40">
@@ -7799,7 +7799,7 @@
               </p14:xfrm>
             </p:contentPart>
           </mc:Choice>
-          <mc:Fallback>
+          <mc:Fallback xmlns="">
             <p:pic>
               <p:nvPicPr>
                 <p:cNvPr id="41" name="Ink 40">
@@ -7830,8 +7830,8 @@
             </p:pic>
           </mc:Fallback>
         </mc:AlternateContent>
-        <mc:AlternateContent xmlns:mc="http://schemas.openxmlformats.org/markup-compatibility/2006">
-          <mc:Choice xmlns:p14="http://schemas.microsoft.com/office/powerpoint/2010/main" Requires="p14">
+        <mc:AlternateContent xmlns:mc="http://schemas.openxmlformats.org/markup-compatibility/2006" xmlns:p14="http://schemas.microsoft.com/office/powerpoint/2010/main">
+          <mc:Choice Requires="p14">
             <p:contentPart p14:bwMode="auto" r:id="rId27">
               <p14:nvContentPartPr>
                 <p14:cNvPr id="42" name="Ink 41">
@@ -7850,7 +7850,7 @@
               </p14:xfrm>
             </p:contentPart>
           </mc:Choice>
-          <mc:Fallback>
+          <mc:Fallback xmlns="">
             <p:pic>
               <p:nvPicPr>
                 <p:cNvPr id="42" name="Ink 41">
@@ -8127,8 +8127,8 @@
             </mc:Fallback>
           </mc:AlternateContent>
         </p:grpSp>
-        <mc:AlternateContent xmlns:mc="http://schemas.openxmlformats.org/markup-compatibility/2006">
-          <mc:Choice xmlns:p14="http://schemas.microsoft.com/office/powerpoint/2010/main" Requires="p14">
+        <mc:AlternateContent xmlns:mc="http://schemas.openxmlformats.org/markup-compatibility/2006" xmlns:p14="http://schemas.microsoft.com/office/powerpoint/2010/main">
+          <mc:Choice Requires="p14">
             <p:contentPart p14:bwMode="auto" r:id="rId32">
               <p14:nvContentPartPr>
                 <p14:cNvPr id="49" name="Ink 48">
@@ -8147,7 +8147,7 @@
               </p14:xfrm>
             </p:contentPart>
           </mc:Choice>
-          <mc:Fallback>
+          <mc:Fallback xmlns="">
             <p:pic>
               <p:nvPicPr>
                 <p:cNvPr id="49" name="Ink 48">
@@ -8178,8 +8178,8 @@
             </p:pic>
           </mc:Fallback>
         </mc:AlternateContent>
-        <mc:AlternateContent xmlns:mc="http://schemas.openxmlformats.org/markup-compatibility/2006">
-          <mc:Choice xmlns:p14="http://schemas.microsoft.com/office/powerpoint/2010/main" Requires="p14">
+        <mc:AlternateContent xmlns:mc="http://schemas.openxmlformats.org/markup-compatibility/2006" xmlns:p14="http://schemas.microsoft.com/office/powerpoint/2010/main">
+          <mc:Choice Requires="p14">
             <p:contentPart p14:bwMode="auto" r:id="rId33">
               <p14:nvContentPartPr>
                 <p14:cNvPr id="50" name="Ink 49">
@@ -8198,7 +8198,7 @@
               </p14:xfrm>
             </p:contentPart>
           </mc:Choice>
-          <mc:Fallback>
+          <mc:Fallback xmlns="">
             <p:pic>
               <p:nvPicPr>
                 <p:cNvPr id="50" name="Ink 49">
@@ -10671,7 +10671,7 @@
         </p:nvGrpSpPr>
         <p:grpSpPr>
           <a:xfrm>
-            <a:off x="1766736" y="1452096"/>
+            <a:off x="1766736" y="1418643"/>
             <a:ext cx="8344800" cy="176040"/>
             <a:chOff x="1382688" y="5191992"/>
             <a:chExt cx="8344800" cy="176040"/>
@@ -10780,8 +10780,8 @@
           </mc:Fallback>
         </mc:AlternateContent>
       </p:grpSp>
-      <mc:AlternateContent xmlns:mc="http://schemas.openxmlformats.org/markup-compatibility/2006" xmlns:p14="http://schemas.microsoft.com/office/powerpoint/2010/main">
-        <mc:Choice Requires="p14">
+      <mc:AlternateContent xmlns:mc="http://schemas.openxmlformats.org/markup-compatibility/2006">
+        <mc:Choice xmlns:p14="http://schemas.microsoft.com/office/powerpoint/2010/main" Requires="p14">
           <p:contentPart p14:bwMode="auto" r:id="rId6">
             <p14:nvContentPartPr>
               <p14:cNvPr id="31" name="Ink 30">
@@ -10795,12 +10795,12 @@
               <p14:nvPr/>
             </p14:nvContentPartPr>
             <p14:xfrm>
-              <a:off x="8679456" y="1467216"/>
+              <a:off x="8679456" y="1433763"/>
               <a:ext cx="360" cy="189720"/>
             </p14:xfrm>
           </p:contentPart>
         </mc:Choice>
-        <mc:Fallback xmlns="">
+        <mc:Fallback>
           <p:pic>
             <p:nvPicPr>
               <p:cNvPr id="31" name="Ink 30">
@@ -10821,7 +10821,7 @@
             </p:blipFill>
             <p:spPr>
               <a:xfrm>
-                <a:off x="8661456" y="1449576"/>
+                <a:off x="8661456" y="1415763"/>
                 <a:ext cx="36000" cy="225360"/>
               </a:xfrm>
               <a:prstGeom prst="rect">
@@ -10831,8 +10831,8 @@
           </p:pic>
         </mc:Fallback>
       </mc:AlternateContent>
-      <mc:AlternateContent xmlns:mc="http://schemas.openxmlformats.org/markup-compatibility/2006" xmlns:p14="http://schemas.microsoft.com/office/powerpoint/2010/main">
-        <mc:Choice Requires="p14">
+      <mc:AlternateContent xmlns:mc="http://schemas.openxmlformats.org/markup-compatibility/2006">
+        <mc:Choice xmlns:p14="http://schemas.microsoft.com/office/powerpoint/2010/main" Requires="p14">
           <p:contentPart p14:bwMode="auto" r:id="rId8">
             <p14:nvContentPartPr>
               <p14:cNvPr id="32" name="Ink 31">
@@ -10846,12 +10846,12 @@
               <p14:nvPr/>
             </p14:nvContentPartPr>
             <p14:xfrm>
-              <a:off x="7290576" y="1478376"/>
+              <a:off x="7290576" y="1444923"/>
               <a:ext cx="360" cy="221040"/>
             </p14:xfrm>
           </p:contentPart>
         </mc:Choice>
-        <mc:Fallback xmlns="">
+        <mc:Fallback>
           <p:pic>
             <p:nvPicPr>
               <p:cNvPr id="32" name="Ink 31">
@@ -10872,7 +10872,7 @@
             </p:blipFill>
             <p:spPr>
               <a:xfrm>
-                <a:off x="7272936" y="1460376"/>
+                <a:off x="7272576" y="1426923"/>
                 <a:ext cx="36000" cy="256680"/>
               </a:xfrm>
               <a:prstGeom prst="rect">
@@ -10882,8 +10882,8 @@
           </p:pic>
         </mc:Fallback>
       </mc:AlternateContent>
-      <mc:AlternateContent xmlns:mc="http://schemas.openxmlformats.org/markup-compatibility/2006" xmlns:p14="http://schemas.microsoft.com/office/powerpoint/2010/main">
-        <mc:Choice Requires="p14">
+      <mc:AlternateContent xmlns:mc="http://schemas.openxmlformats.org/markup-compatibility/2006">
+        <mc:Choice xmlns:p14="http://schemas.microsoft.com/office/powerpoint/2010/main" Requires="p14">
           <p:contentPart p14:bwMode="auto" r:id="rId10">
             <p14:nvContentPartPr>
               <p14:cNvPr id="33" name="Ink 32">
@@ -10897,12 +10897,12 @@
               <p14:nvPr/>
             </p14:nvContentPartPr>
             <p14:xfrm>
-              <a:off x="5918256" y="1447056"/>
+              <a:off x="5918256" y="1413603"/>
               <a:ext cx="360" cy="235800"/>
             </p14:xfrm>
           </p:contentPart>
         </mc:Choice>
-        <mc:Fallback xmlns="">
+        <mc:Fallback>
           <p:pic>
             <p:nvPicPr>
               <p:cNvPr id="33" name="Ink 32">
@@ -10923,7 +10923,7 @@
             </p:blipFill>
             <p:spPr>
               <a:xfrm>
-                <a:off x="5900256" y="1429416"/>
+                <a:off x="5900256" y="1395603"/>
                 <a:ext cx="36000" cy="271440"/>
               </a:xfrm>
               <a:prstGeom prst="rect">
@@ -10933,8 +10933,8 @@
           </p:pic>
         </mc:Fallback>
       </mc:AlternateContent>
-      <mc:AlternateContent xmlns:mc="http://schemas.openxmlformats.org/markup-compatibility/2006" xmlns:p14="http://schemas.microsoft.com/office/powerpoint/2010/main">
-        <mc:Choice Requires="p14">
+      <mc:AlternateContent xmlns:mc="http://schemas.openxmlformats.org/markup-compatibility/2006">
+        <mc:Choice xmlns:p14="http://schemas.microsoft.com/office/powerpoint/2010/main" Requires="p14">
           <p:contentPart p14:bwMode="auto" r:id="rId12">
             <p14:nvContentPartPr>
               <p14:cNvPr id="34" name="Ink 33">
@@ -10948,12 +10948,12 @@
               <p14:nvPr/>
             </p14:nvContentPartPr>
             <p14:xfrm>
-              <a:off x="4634496" y="1499616"/>
+              <a:off x="4634496" y="1466163"/>
               <a:ext cx="2520" cy="228600"/>
             </p14:xfrm>
           </p:contentPart>
         </mc:Choice>
-        <mc:Fallback xmlns="">
+        <mc:Fallback>
           <p:pic>
             <p:nvPicPr>
               <p:cNvPr id="34" name="Ink 33">
@@ -10974,7 +10974,7 @@
             </p:blipFill>
             <p:spPr>
               <a:xfrm>
-                <a:off x="4616856" y="1481616"/>
+                <a:off x="4616496" y="1448163"/>
                 <a:ext cx="38160" cy="264240"/>
               </a:xfrm>
               <a:prstGeom prst="rect">
@@ -10984,8 +10984,8 @@
           </p:pic>
         </mc:Fallback>
       </mc:AlternateContent>
-      <mc:AlternateContent xmlns:mc="http://schemas.openxmlformats.org/markup-compatibility/2006" xmlns:p14="http://schemas.microsoft.com/office/powerpoint/2010/main">
-        <mc:Choice Requires="p14">
+      <mc:AlternateContent xmlns:mc="http://schemas.openxmlformats.org/markup-compatibility/2006">
+        <mc:Choice xmlns:p14="http://schemas.microsoft.com/office/powerpoint/2010/main" Requires="p14">
           <p:contentPart p14:bwMode="auto" r:id="rId14">
             <p14:nvContentPartPr>
               <p14:cNvPr id="35" name="Ink 34">
@@ -10999,12 +10999,12 @@
               <p14:nvPr/>
             </p14:nvContentPartPr>
             <p14:xfrm>
-              <a:off x="3159936" y="1443096"/>
+              <a:off x="3159936" y="1409643"/>
               <a:ext cx="360" cy="224640"/>
             </p14:xfrm>
           </p:contentPart>
         </mc:Choice>
-        <mc:Fallback xmlns="">
+        <mc:Fallback>
           <p:pic>
             <p:nvPicPr>
               <p:cNvPr id="35" name="Ink 34">
@@ -11025,8 +11025,8 @@
             </p:blipFill>
             <p:spPr>
               <a:xfrm>
-                <a:off x="3141936" y="1425096"/>
-                <a:ext cx="36000" cy="260280"/>
+                <a:off x="3141936" y="1391672"/>
+                <a:ext cx="36000" cy="260223"/>
               </a:xfrm>
               <a:prstGeom prst="rect">
                 <a:avLst/>
@@ -11035,8 +11035,8 @@
           </p:pic>
         </mc:Fallback>
       </mc:AlternateContent>
-      <mc:AlternateContent xmlns:mc="http://schemas.openxmlformats.org/markup-compatibility/2006" xmlns:p14="http://schemas.microsoft.com/office/powerpoint/2010/main">
-        <mc:Choice Requires="p14">
+      <mc:AlternateContent xmlns:mc="http://schemas.openxmlformats.org/markup-compatibility/2006">
+        <mc:Choice xmlns:p14="http://schemas.microsoft.com/office/powerpoint/2010/main" Requires="p14">
           <p:contentPart p14:bwMode="auto" r:id="rId16">
             <p14:nvContentPartPr>
               <p14:cNvPr id="36" name="Ink 35">
@@ -11050,12 +11050,12 @@
               <p14:nvPr/>
             </p14:nvContentPartPr>
             <p14:xfrm>
-              <a:off x="1768536" y="1446336"/>
+              <a:off x="1768536" y="1412883"/>
               <a:ext cx="5400" cy="264960"/>
             </p14:xfrm>
           </p:contentPart>
         </mc:Choice>
-        <mc:Fallback xmlns="">
+        <mc:Fallback>
           <p:pic>
             <p:nvPicPr>
               <p:cNvPr id="36" name="Ink 35">
@@ -11076,8 +11076,8 @@
             </p:blipFill>
             <p:spPr>
               <a:xfrm>
-                <a:off x="1750896" y="1428696"/>
-                <a:ext cx="41040" cy="300600"/>
+                <a:off x="1749250" y="1394859"/>
+                <a:ext cx="43586" cy="300648"/>
               </a:xfrm>
               <a:prstGeom prst="rect">
                 <a:avLst/>
@@ -11100,7 +11100,7 @@
         </p:nvSpPr>
         <p:spPr>
           <a:xfrm>
-            <a:off x="7970208" y="2968358"/>
+            <a:off x="7970208" y="2433103"/>
             <a:ext cx="1371600" cy="369332"/>
           </a:xfrm>
           <a:prstGeom prst="rect">
@@ -11139,7 +11139,7 @@
         </p:nvSpPr>
         <p:spPr>
           <a:xfrm>
-            <a:off x="6592188" y="2691359"/>
+            <a:off x="6592188" y="2156104"/>
             <a:ext cx="1371600" cy="646331"/>
           </a:xfrm>
           <a:prstGeom prst="rect">
@@ -11178,7 +11178,7 @@
         </p:nvSpPr>
         <p:spPr>
           <a:xfrm>
-            <a:off x="5214168" y="2691359"/>
+            <a:off x="5214168" y="2156104"/>
             <a:ext cx="1371600" cy="646331"/>
           </a:xfrm>
           <a:prstGeom prst="rect">
@@ -11217,7 +11217,7 @@
         </p:nvSpPr>
         <p:spPr>
           <a:xfrm>
-            <a:off x="3836148" y="2968358"/>
+            <a:off x="3836148" y="2433103"/>
             <a:ext cx="1371600" cy="369332"/>
           </a:xfrm>
           <a:prstGeom prst="rect">
@@ -11256,7 +11256,7 @@
         </p:nvSpPr>
         <p:spPr>
           <a:xfrm>
-            <a:off x="2458128" y="2968358"/>
+            <a:off x="2458128" y="2433103"/>
             <a:ext cx="1371600" cy="369332"/>
           </a:xfrm>
           <a:prstGeom prst="rect">
@@ -11281,8 +11281,8 @@
           </a:p>
         </p:txBody>
       </p:sp>
-      <mc:AlternateContent xmlns:mc="http://schemas.openxmlformats.org/markup-compatibility/2006" xmlns:p14="http://schemas.microsoft.com/office/powerpoint/2010/main">
-        <mc:Choice Requires="p14">
+      <mc:AlternateContent xmlns:mc="http://schemas.openxmlformats.org/markup-compatibility/2006">
+        <mc:Choice xmlns:p14="http://schemas.microsoft.com/office/powerpoint/2010/main" Requires="p14">
           <p:contentPart p14:bwMode="auto" r:id="rId18">
             <p14:nvContentPartPr>
               <p14:cNvPr id="48" name="Ink 47">
@@ -11296,12 +11296,12 @@
               <p14:nvPr/>
             </p14:nvContentPartPr>
             <p14:xfrm>
-              <a:off x="3170040" y="3574728"/>
+              <a:off x="3170040" y="2939114"/>
               <a:ext cx="5486400" cy="79920"/>
             </p14:xfrm>
           </p:contentPart>
         </mc:Choice>
-        <mc:Fallback xmlns="">
+        <mc:Fallback>
           <p:pic>
             <p:nvPicPr>
               <p:cNvPr id="48" name="Ink 47">
@@ -11322,7 +11322,7 @@
             </p:blipFill>
             <p:spPr>
               <a:xfrm>
-                <a:off x="3152040" y="3556728"/>
+                <a:off x="3152040" y="2921114"/>
                 <a:ext cx="5522040" cy="115560"/>
               </a:xfrm>
               <a:prstGeom prst="rect">
@@ -11332,8 +11332,8 @@
           </p:pic>
         </mc:Fallback>
       </mc:AlternateContent>
-      <mc:AlternateContent xmlns:mc="http://schemas.openxmlformats.org/markup-compatibility/2006" xmlns:p14="http://schemas.microsoft.com/office/powerpoint/2010/main">
-        <mc:Choice Requires="p14">
+      <mc:AlternateContent xmlns:mc="http://schemas.openxmlformats.org/markup-compatibility/2006">
+        <mc:Choice xmlns:p14="http://schemas.microsoft.com/office/powerpoint/2010/main" Requires="p14">
           <p:contentPart p14:bwMode="auto" r:id="rId20">
             <p14:nvContentPartPr>
               <p14:cNvPr id="49" name="Ink 48">
@@ -11347,12 +11347,12 @@
               <p14:nvPr/>
             </p14:nvContentPartPr>
             <p14:xfrm>
-              <a:off x="8693592" y="3481992"/>
+              <a:off x="8693592" y="2846378"/>
               <a:ext cx="11160" cy="270000"/>
             </p14:xfrm>
           </p:contentPart>
         </mc:Choice>
-        <mc:Fallback xmlns="">
+        <mc:Fallback>
           <p:pic>
             <p:nvPicPr>
               <p:cNvPr id="49" name="Ink 48">
@@ -11373,8 +11373,8 @@
             </p:blipFill>
             <p:spPr>
               <a:xfrm>
-                <a:off x="8675592" y="3464352"/>
-                <a:ext cx="46800" cy="305640"/>
+                <a:off x="8676154" y="2828378"/>
+                <a:ext cx="45686" cy="305640"/>
               </a:xfrm>
               <a:prstGeom prst="rect">
                 <a:avLst/>
@@ -11383,8 +11383,8 @@
           </p:pic>
         </mc:Fallback>
       </mc:AlternateContent>
-      <mc:AlternateContent xmlns:mc="http://schemas.openxmlformats.org/markup-compatibility/2006" xmlns:p14="http://schemas.microsoft.com/office/powerpoint/2010/main">
-        <mc:Choice Requires="p14">
+      <mc:AlternateContent xmlns:mc="http://schemas.openxmlformats.org/markup-compatibility/2006">
+        <mc:Choice xmlns:p14="http://schemas.microsoft.com/office/powerpoint/2010/main" Requires="p14">
           <p:contentPart p14:bwMode="auto" r:id="rId22">
             <p14:nvContentPartPr>
               <p14:cNvPr id="51" name="Ink 50">
@@ -11398,12 +11398,12 @@
               <p14:nvPr/>
             </p14:nvContentPartPr>
             <p14:xfrm>
-              <a:off x="7301760" y="3501648"/>
+              <a:off x="7301760" y="2866034"/>
               <a:ext cx="360" cy="231120"/>
             </p14:xfrm>
           </p:contentPart>
         </mc:Choice>
-        <mc:Fallback xmlns="">
+        <mc:Fallback>
           <p:pic>
             <p:nvPicPr>
               <p:cNvPr id="51" name="Ink 50">
@@ -11424,7 +11424,7 @@
             </p:blipFill>
             <p:spPr>
               <a:xfrm>
-                <a:off x="7283760" y="3484008"/>
+                <a:off x="7283760" y="2848034"/>
                 <a:ext cx="36000" cy="266760"/>
               </a:xfrm>
               <a:prstGeom prst="rect">
@@ -11434,8 +11434,8 @@
           </p:pic>
         </mc:Fallback>
       </mc:AlternateContent>
-      <mc:AlternateContent xmlns:mc="http://schemas.openxmlformats.org/markup-compatibility/2006" xmlns:p14="http://schemas.microsoft.com/office/powerpoint/2010/main">
-        <mc:Choice Requires="p14">
+      <mc:AlternateContent xmlns:mc="http://schemas.openxmlformats.org/markup-compatibility/2006">
+        <mc:Choice xmlns:p14="http://schemas.microsoft.com/office/powerpoint/2010/main" Requires="p14">
           <p:contentPart p14:bwMode="auto" r:id="rId24">
             <p14:nvContentPartPr>
               <p14:cNvPr id="52" name="Ink 51">
@@ -11449,12 +11449,12 @@
               <p14:nvPr/>
             </p14:nvContentPartPr>
             <p14:xfrm>
-              <a:off x="5944560" y="3509208"/>
+              <a:off x="5944560" y="2873594"/>
               <a:ext cx="360" cy="246960"/>
             </p14:xfrm>
           </p:contentPart>
         </mc:Choice>
-        <mc:Fallback xmlns="">
+        <mc:Fallback>
           <p:pic>
             <p:nvPicPr>
               <p:cNvPr id="52" name="Ink 51">
@@ -11475,7 +11475,7 @@
             </p:blipFill>
             <p:spPr>
               <a:xfrm>
-                <a:off x="5926560" y="3491568"/>
+                <a:off x="5926560" y="2855594"/>
                 <a:ext cx="36000" cy="282600"/>
               </a:xfrm>
               <a:prstGeom prst="rect">
@@ -11485,8 +11485,8 @@
           </p:pic>
         </mc:Fallback>
       </mc:AlternateContent>
-      <mc:AlternateContent xmlns:mc="http://schemas.openxmlformats.org/markup-compatibility/2006" xmlns:p14="http://schemas.microsoft.com/office/powerpoint/2010/main">
-        <mc:Choice Requires="p14">
+      <mc:AlternateContent xmlns:mc="http://schemas.openxmlformats.org/markup-compatibility/2006">
+        <mc:Choice xmlns:p14="http://schemas.microsoft.com/office/powerpoint/2010/main" Requires="p14">
           <p:contentPart p14:bwMode="auto" r:id="rId26">
             <p14:nvContentPartPr>
               <p14:cNvPr id="53" name="Ink 52">
@@ -11500,12 +11500,12 @@
               <p14:nvPr/>
             </p14:nvContentPartPr>
             <p14:xfrm>
-              <a:off x="4611480" y="3556368"/>
+              <a:off x="4611480" y="2920754"/>
               <a:ext cx="11520" cy="231480"/>
             </p14:xfrm>
           </p:contentPart>
         </mc:Choice>
-        <mc:Fallback xmlns="">
+        <mc:Fallback>
           <p:pic>
             <p:nvPicPr>
               <p:cNvPr id="53" name="Ink 52">
@@ -11526,8 +11526,8 @@
             </p:blipFill>
             <p:spPr>
               <a:xfrm>
-                <a:off x="4593840" y="3538728"/>
-                <a:ext cx="47160" cy="267120"/>
+                <a:off x="4592899" y="2902754"/>
+                <a:ext cx="48310" cy="267120"/>
               </a:xfrm>
               <a:prstGeom prst="rect">
                 <a:avLst/>
@@ -11536,8 +11536,8 @@
           </p:pic>
         </mc:Fallback>
       </mc:AlternateContent>
-      <mc:AlternateContent xmlns:mc="http://schemas.openxmlformats.org/markup-compatibility/2006" xmlns:p14="http://schemas.microsoft.com/office/powerpoint/2010/main">
-        <mc:Choice Requires="p14">
+      <mc:AlternateContent xmlns:mc="http://schemas.openxmlformats.org/markup-compatibility/2006">
+        <mc:Choice xmlns:p14="http://schemas.microsoft.com/office/powerpoint/2010/main" Requires="p14">
           <p:contentPart p14:bwMode="auto" r:id="rId28">
             <p14:nvContentPartPr>
               <p14:cNvPr id="55" name="Ink 54">
@@ -11551,12 +11551,12 @@
               <p14:nvPr/>
             </p14:nvContentPartPr>
             <p14:xfrm>
-              <a:off x="3156000" y="3450168"/>
+              <a:off x="3156000" y="2836856"/>
               <a:ext cx="5760" cy="261000"/>
             </p14:xfrm>
           </p:contentPart>
         </mc:Choice>
-        <mc:Fallback xmlns="">
+        <mc:Fallback>
           <p:pic>
             <p:nvPicPr>
               <p:cNvPr id="55" name="Ink 54">
@@ -11577,8 +11577,8 @@
             </p:blipFill>
             <p:spPr>
               <a:xfrm>
-                <a:off x="3138360" y="3432528"/>
-                <a:ext cx="41400" cy="296640"/>
+                <a:off x="3136800" y="2818856"/>
+                <a:ext cx="43776" cy="296640"/>
               </a:xfrm>
               <a:prstGeom prst="rect">
                 <a:avLst/>
@@ -11719,8 +11719,8 @@
           </p:pic>
         </mc:Fallback>
       </mc:AlternateContent>
-      <mc:AlternateContent xmlns:mc="http://schemas.openxmlformats.org/markup-compatibility/2006">
-        <mc:Choice xmlns:p14="http://schemas.microsoft.com/office/powerpoint/2010/main" Requires="p14">
+      <mc:AlternateContent xmlns:mc="http://schemas.openxmlformats.org/markup-compatibility/2006" xmlns:p14="http://schemas.microsoft.com/office/powerpoint/2010/main">
+        <mc:Choice Requires="p14">
           <p:contentPart p14:bwMode="auto" r:id="rId6">
             <p14:nvContentPartPr>
               <p14:cNvPr id="20" name="Ink 19">
@@ -11739,7 +11739,7 @@
             </p14:xfrm>
           </p:contentPart>
         </mc:Choice>
-        <mc:Fallback>
+        <mc:Fallback xmlns="">
           <p:pic>
             <p:nvPicPr>
               <p:cNvPr id="20" name="Ink 19">
@@ -11770,8 +11770,8 @@
           </p:pic>
         </mc:Fallback>
       </mc:AlternateContent>
-      <mc:AlternateContent xmlns:mc="http://schemas.openxmlformats.org/markup-compatibility/2006">
-        <mc:Choice xmlns:p14="http://schemas.microsoft.com/office/powerpoint/2010/main" Requires="p14">
+      <mc:AlternateContent xmlns:mc="http://schemas.openxmlformats.org/markup-compatibility/2006" xmlns:p14="http://schemas.microsoft.com/office/powerpoint/2010/main">
+        <mc:Choice Requires="p14">
           <p:contentPart p14:bwMode="auto" r:id="rId8">
             <p14:nvContentPartPr>
               <p14:cNvPr id="21" name="Ink 20">
@@ -11790,7 +11790,7 @@
             </p14:xfrm>
           </p:contentPart>
         </mc:Choice>
-        <mc:Fallback>
+        <mc:Fallback xmlns="">
           <p:pic>
             <p:nvPicPr>
               <p:cNvPr id="21" name="Ink 20">
@@ -11821,8 +11821,8 @@
           </p:pic>
         </mc:Fallback>
       </mc:AlternateContent>
-      <mc:AlternateContent xmlns:mc="http://schemas.openxmlformats.org/markup-compatibility/2006">
-        <mc:Choice xmlns:p14="http://schemas.microsoft.com/office/powerpoint/2010/main" Requires="p14">
+      <mc:AlternateContent xmlns:mc="http://schemas.openxmlformats.org/markup-compatibility/2006" xmlns:p14="http://schemas.microsoft.com/office/powerpoint/2010/main">
+        <mc:Choice Requires="p14">
           <p:contentPart p14:bwMode="auto" r:id="rId10">
             <p14:nvContentPartPr>
               <p14:cNvPr id="22" name="Ink 21">
@@ -11841,7 +11841,7 @@
             </p14:xfrm>
           </p:contentPart>
         </mc:Choice>
-        <mc:Fallback>
+        <mc:Fallback xmlns="">
           <p:pic>
             <p:nvPicPr>
               <p:cNvPr id="22" name="Ink 21">
@@ -11872,8 +11872,8 @@
           </p:pic>
         </mc:Fallback>
       </mc:AlternateContent>
-      <mc:AlternateContent xmlns:mc="http://schemas.openxmlformats.org/markup-compatibility/2006">
-        <mc:Choice xmlns:p14="http://schemas.microsoft.com/office/powerpoint/2010/main" Requires="p14">
+      <mc:AlternateContent xmlns:mc="http://schemas.openxmlformats.org/markup-compatibility/2006" xmlns:p14="http://schemas.microsoft.com/office/powerpoint/2010/main">
+        <mc:Choice Requires="p14">
           <p:contentPart p14:bwMode="auto" r:id="rId12">
             <p14:nvContentPartPr>
               <p14:cNvPr id="23" name="Ink 22">
@@ -11892,7 +11892,7 @@
             </p14:xfrm>
           </p:contentPart>
         </mc:Choice>
-        <mc:Fallback>
+        <mc:Fallback xmlns="">
           <p:pic>
             <p:nvPicPr>
               <p:cNvPr id="23" name="Ink 22">
@@ -11923,8 +11923,8 @@
           </p:pic>
         </mc:Fallback>
       </mc:AlternateContent>
-      <mc:AlternateContent xmlns:mc="http://schemas.openxmlformats.org/markup-compatibility/2006">
-        <mc:Choice xmlns:p14="http://schemas.microsoft.com/office/powerpoint/2010/main" Requires="p14">
+      <mc:AlternateContent xmlns:mc="http://schemas.openxmlformats.org/markup-compatibility/2006" xmlns:p14="http://schemas.microsoft.com/office/powerpoint/2010/main">
+        <mc:Choice Requires="p14">
           <p:contentPart p14:bwMode="auto" r:id="rId14">
             <p14:nvContentPartPr>
               <p14:cNvPr id="24" name="Ink 23">
@@ -11943,7 +11943,7 @@
             </p14:xfrm>
           </p:contentPart>
         </mc:Choice>
-        <mc:Fallback>
+        <mc:Fallback xmlns="">
           <p:pic>
             <p:nvPicPr>
               <p:cNvPr id="24" name="Ink 23">
@@ -12141,8 +12141,8 @@
           </a:p>
         </p:txBody>
       </p:sp>
-      <mc:AlternateContent xmlns:mc="http://schemas.openxmlformats.org/markup-compatibility/2006">
-        <mc:Choice xmlns:p14="http://schemas.microsoft.com/office/powerpoint/2010/main" Requires="p14">
+      <mc:AlternateContent xmlns:mc="http://schemas.openxmlformats.org/markup-compatibility/2006" xmlns:p14="http://schemas.microsoft.com/office/powerpoint/2010/main">
+        <mc:Choice Requires="p14">
           <p:contentPart p14:bwMode="auto" r:id="rId20">
             <p14:nvContentPartPr>
               <p14:cNvPr id="33" name="Ink 32">
@@ -12161,7 +12161,7 @@
             </p14:xfrm>
           </p:contentPart>
         </mc:Choice>
-        <mc:Fallback>
+        <mc:Fallback xmlns="">
           <p:pic>
             <p:nvPicPr>
               <p:cNvPr id="33" name="Ink 32">
@@ -12578,8 +12578,8 @@
           </p:pic>
         </mc:Fallback>
       </mc:AlternateContent>
-      <mc:AlternateContent xmlns:mc="http://schemas.openxmlformats.org/markup-compatibility/2006">
-        <mc:Choice xmlns:p14="http://schemas.microsoft.com/office/powerpoint/2010/main" Requires="p14">
+      <mc:AlternateContent xmlns:mc="http://schemas.openxmlformats.org/markup-compatibility/2006" xmlns:p14="http://schemas.microsoft.com/office/powerpoint/2010/main">
+        <mc:Choice Requires="p14">
           <p:contentPart p14:bwMode="auto" r:id="rId31">
             <p14:nvContentPartPr>
               <p14:cNvPr id="49" name="Ink 48">
@@ -12598,7 +12598,7 @@
             </p14:xfrm>
           </p:contentPart>
         </mc:Choice>
-        <mc:Fallback>
+        <mc:Fallback xmlns="">
           <p:pic>
             <p:nvPicPr>
               <p:cNvPr id="49" name="Ink 48">
@@ -12629,8 +12629,8 @@
           </p:pic>
         </mc:Fallback>
       </mc:AlternateContent>
-      <mc:AlternateContent xmlns:mc="http://schemas.openxmlformats.org/markup-compatibility/2006">
-        <mc:Choice xmlns:p14="http://schemas.microsoft.com/office/powerpoint/2010/main" Requires="p14">
+      <mc:AlternateContent xmlns:mc="http://schemas.openxmlformats.org/markup-compatibility/2006" xmlns:p14="http://schemas.microsoft.com/office/powerpoint/2010/main">
+        <mc:Choice Requires="p14">
           <p:contentPart p14:bwMode="auto" r:id="rId33">
             <p14:nvContentPartPr>
               <p14:cNvPr id="50" name="Ink 49">
@@ -12649,7 +12649,7 @@
             </p14:xfrm>
           </p:contentPart>
         </mc:Choice>
-        <mc:Fallback>
+        <mc:Fallback xmlns="">
           <p:pic>
             <p:nvPicPr>
               <p:cNvPr id="50" name="Ink 49">
@@ -12680,8 +12680,8 @@
           </p:pic>
         </mc:Fallback>
       </mc:AlternateContent>
-      <mc:AlternateContent xmlns:mc="http://schemas.openxmlformats.org/markup-compatibility/2006">
-        <mc:Choice xmlns:p14="http://schemas.microsoft.com/office/powerpoint/2010/main" Requires="p14">
+      <mc:AlternateContent xmlns:mc="http://schemas.openxmlformats.org/markup-compatibility/2006" xmlns:p14="http://schemas.microsoft.com/office/powerpoint/2010/main">
+        <mc:Choice Requires="p14">
           <p:contentPart p14:bwMode="auto" r:id="rId35">
             <p14:nvContentPartPr>
               <p14:cNvPr id="51" name="Ink 50">
@@ -12700,7 +12700,7 @@
             </p14:xfrm>
           </p:contentPart>
         </mc:Choice>
-        <mc:Fallback>
+        <mc:Fallback xmlns="">
           <p:pic>
             <p:nvPicPr>
               <p:cNvPr id="51" name="Ink 50">
@@ -12731,8 +12731,8 @@
           </p:pic>
         </mc:Fallback>
       </mc:AlternateContent>
-      <mc:AlternateContent xmlns:mc="http://schemas.openxmlformats.org/markup-compatibility/2006">
-        <mc:Choice xmlns:p14="http://schemas.microsoft.com/office/powerpoint/2010/main" Requires="p14">
+      <mc:AlternateContent xmlns:mc="http://schemas.openxmlformats.org/markup-compatibility/2006" xmlns:p14="http://schemas.microsoft.com/office/powerpoint/2010/main">
+        <mc:Choice Requires="p14">
           <p:contentPart p14:bwMode="auto" r:id="rId37">
             <p14:nvContentPartPr>
               <p14:cNvPr id="52" name="Ink 51">
@@ -12751,7 +12751,7 @@
             </p14:xfrm>
           </p:contentPart>
         </mc:Choice>
-        <mc:Fallback>
+        <mc:Fallback xmlns="">
           <p:pic>
             <p:nvPicPr>
               <p:cNvPr id="52" name="Ink 51">
@@ -12782,8 +12782,8 @@
           </p:pic>
         </mc:Fallback>
       </mc:AlternateContent>
-      <mc:AlternateContent xmlns:mc="http://schemas.openxmlformats.org/markup-compatibility/2006">
-        <mc:Choice xmlns:p14="http://schemas.microsoft.com/office/powerpoint/2010/main" Requires="p14">
+      <mc:AlternateContent xmlns:mc="http://schemas.openxmlformats.org/markup-compatibility/2006" xmlns:p14="http://schemas.microsoft.com/office/powerpoint/2010/main">
+        <mc:Choice Requires="p14">
           <p:contentPart p14:bwMode="auto" r:id="rId39">
             <p14:nvContentPartPr>
               <p14:cNvPr id="53" name="Ink 52">
@@ -12802,7 +12802,7 @@
             </p14:xfrm>
           </p:contentPart>
         </mc:Choice>
-        <mc:Fallback>
+        <mc:Fallback xmlns="">
           <p:pic>
             <p:nvPicPr>
               <p:cNvPr id="53" name="Ink 52">
@@ -12833,8 +12833,8 @@
           </p:pic>
         </mc:Fallback>
       </mc:AlternateContent>
-      <mc:AlternateContent xmlns:mc="http://schemas.openxmlformats.org/markup-compatibility/2006">
-        <mc:Choice xmlns:p14="http://schemas.microsoft.com/office/powerpoint/2010/main" Requires="p14">
+      <mc:AlternateContent xmlns:mc="http://schemas.openxmlformats.org/markup-compatibility/2006" xmlns:p14="http://schemas.microsoft.com/office/powerpoint/2010/main">
+        <mc:Choice Requires="p14">
           <p:contentPart p14:bwMode="auto" r:id="rId41">
             <p14:nvContentPartPr>
               <p14:cNvPr id="54" name="Ink 53">
@@ -12853,7 +12853,7 @@
             </p14:xfrm>
           </p:contentPart>
         </mc:Choice>
-        <mc:Fallback>
+        <mc:Fallback xmlns="">
           <p:pic>
             <p:nvPicPr>
               <p:cNvPr id="54" name="Ink 53">
@@ -12884,8 +12884,8 @@
           </p:pic>
         </mc:Fallback>
       </mc:AlternateContent>
-      <mc:AlternateContent xmlns:mc="http://schemas.openxmlformats.org/markup-compatibility/2006">
-        <mc:Choice xmlns:p14="http://schemas.microsoft.com/office/powerpoint/2010/main" Requires="p14">
+      <mc:AlternateContent xmlns:mc="http://schemas.openxmlformats.org/markup-compatibility/2006" xmlns:p14="http://schemas.microsoft.com/office/powerpoint/2010/main">
+        <mc:Choice Requires="p14">
           <p:contentPart p14:bwMode="auto" r:id="rId43">
             <p14:nvContentPartPr>
               <p14:cNvPr id="55" name="Ink 54">
@@ -12904,7 +12904,7 @@
             </p14:xfrm>
           </p:contentPart>
         </mc:Choice>
-        <mc:Fallback>
+        <mc:Fallback xmlns="">
           <p:pic>
             <p:nvPicPr>
               <p:cNvPr id="55" name="Ink 54">
@@ -12935,8 +12935,8 @@
           </p:pic>
         </mc:Fallback>
       </mc:AlternateContent>
-      <mc:AlternateContent xmlns:mc="http://schemas.openxmlformats.org/markup-compatibility/2006">
-        <mc:Choice xmlns:p14="http://schemas.microsoft.com/office/powerpoint/2010/main" Requires="p14">
+      <mc:AlternateContent xmlns:mc="http://schemas.openxmlformats.org/markup-compatibility/2006" xmlns:p14="http://schemas.microsoft.com/office/powerpoint/2010/main">
+        <mc:Choice Requires="p14">
           <p:contentPart p14:bwMode="auto" r:id="rId45">
             <p14:nvContentPartPr>
               <p14:cNvPr id="56" name="Ink 55">
@@ -12955,7 +12955,7 @@
             </p14:xfrm>
           </p:contentPart>
         </mc:Choice>
-        <mc:Fallback>
+        <mc:Fallback xmlns="">
           <p:pic>
             <p:nvPicPr>
               <p:cNvPr id="56" name="Ink 55">
@@ -12986,8 +12986,8 @@
           </p:pic>
         </mc:Fallback>
       </mc:AlternateContent>
-      <mc:AlternateContent xmlns:mc="http://schemas.openxmlformats.org/markup-compatibility/2006">
-        <mc:Choice xmlns:p14="http://schemas.microsoft.com/office/powerpoint/2010/main" Requires="p14">
+      <mc:AlternateContent xmlns:mc="http://schemas.openxmlformats.org/markup-compatibility/2006" xmlns:p14="http://schemas.microsoft.com/office/powerpoint/2010/main">
+        <mc:Choice Requires="p14">
           <p:contentPart p14:bwMode="auto" r:id="rId47">
             <p14:nvContentPartPr>
               <p14:cNvPr id="57" name="Ink 56">
@@ -13006,7 +13006,7 @@
             </p14:xfrm>
           </p:contentPart>
         </mc:Choice>
-        <mc:Fallback>
+        <mc:Fallback xmlns="">
           <p:pic>
             <p:nvPicPr>
               <p:cNvPr id="57" name="Ink 56">
@@ -13037,8 +13037,8 @@
           </p:pic>
         </mc:Fallback>
       </mc:AlternateContent>
-      <mc:AlternateContent xmlns:mc="http://schemas.openxmlformats.org/markup-compatibility/2006">
-        <mc:Choice xmlns:p14="http://schemas.microsoft.com/office/powerpoint/2010/main" Requires="p14">
+      <mc:AlternateContent xmlns:mc="http://schemas.openxmlformats.org/markup-compatibility/2006" xmlns:p14="http://schemas.microsoft.com/office/powerpoint/2010/main">
+        <mc:Choice Requires="p14">
           <p:contentPart p14:bwMode="auto" r:id="rId48">
             <p14:nvContentPartPr>
               <p14:cNvPr id="58" name="Ink 57">
@@ -13057,7 +13057,7 @@
             </p14:xfrm>
           </p:contentPart>
         </mc:Choice>
-        <mc:Fallback>
+        <mc:Fallback xmlns="">
           <p:pic>
             <p:nvPicPr>
               <p:cNvPr id="58" name="Ink 57">
@@ -13126,8 +13126,8 @@
           </a:p>
         </p:txBody>
       </p:sp>
-      <mc:AlternateContent xmlns:mc="http://schemas.openxmlformats.org/markup-compatibility/2006">
-        <mc:Choice xmlns:a14="http://schemas.microsoft.com/office/drawing/2010/main" Requires="a14">
+      <mc:AlternateContent xmlns:mc="http://schemas.openxmlformats.org/markup-compatibility/2006" xmlns:a14="http://schemas.microsoft.com/office/drawing/2010/main">
+        <mc:Choice Requires="a14">
           <p:sp>
             <p:nvSpPr>
               <p:cNvPr id="60" name="TextBox 59">
@@ -13219,7 +13219,7 @@
             </p:txBody>
           </p:sp>
         </mc:Choice>
-        <mc:Fallback>
+        <mc:Fallback xmlns="">
           <p:sp>
             <p:nvSpPr>
               <p:cNvPr id="60" name="TextBox 59">
@@ -13618,8 +13618,8 @@
           </a:p>
         </p:txBody>
       </p:sp>
-      <mc:AlternateContent xmlns:mc="http://schemas.openxmlformats.org/markup-compatibility/2006">
-        <mc:Choice xmlns:a14="http://schemas.microsoft.com/office/drawing/2010/main" Requires="a14">
+      <mc:AlternateContent xmlns:mc="http://schemas.openxmlformats.org/markup-compatibility/2006" xmlns:a14="http://schemas.microsoft.com/office/drawing/2010/main">
+        <mc:Choice Requires="a14">
           <p:sp>
             <p:nvSpPr>
               <p:cNvPr id="71" name="TextBox 70">
@@ -13751,7 +13751,7 @@
             </p:txBody>
           </p:sp>
         </mc:Choice>
-        <mc:Fallback>
+        <mc:Fallback xmlns="">
           <p:sp>
             <p:nvSpPr>
               <p:cNvPr id="71" name="TextBox 70">
@@ -13886,8 +13886,8 @@
           </a:p>
         </p:txBody>
       </p:sp>
-      <mc:AlternateContent xmlns:mc="http://schemas.openxmlformats.org/markup-compatibility/2006">
-        <mc:Choice xmlns:p14="http://schemas.microsoft.com/office/powerpoint/2010/main" Requires="p14">
+      <mc:AlternateContent xmlns:mc="http://schemas.openxmlformats.org/markup-compatibility/2006" xmlns:p14="http://schemas.microsoft.com/office/powerpoint/2010/main">
+        <mc:Choice Requires="p14">
           <p:contentPart p14:bwMode="auto" r:id="rId63">
             <p14:nvContentPartPr>
               <p14:cNvPr id="10" name="Ink 9">
@@ -13906,7 +13906,7 @@
             </p14:xfrm>
           </p:contentPart>
         </mc:Choice>
-        <mc:Fallback>
+        <mc:Fallback xmlns="">
           <p:pic>
             <p:nvPicPr>
               <p:cNvPr id="10" name="Ink 9">
@@ -13937,8 +13937,8 @@
           </p:pic>
         </mc:Fallback>
       </mc:AlternateContent>
-      <mc:AlternateContent xmlns:mc="http://schemas.openxmlformats.org/markup-compatibility/2006">
-        <mc:Choice xmlns:p14="http://schemas.microsoft.com/office/powerpoint/2010/main" Requires="p14">
+      <mc:AlternateContent xmlns:mc="http://schemas.openxmlformats.org/markup-compatibility/2006" xmlns:p14="http://schemas.microsoft.com/office/powerpoint/2010/main">
+        <mc:Choice Requires="p14">
           <p:contentPart p14:bwMode="auto" r:id="rId65">
             <p14:nvContentPartPr>
               <p14:cNvPr id="14" name="Ink 13">
@@ -13957,7 +13957,7 @@
             </p14:xfrm>
           </p:contentPart>
         </mc:Choice>
-        <mc:Fallback>
+        <mc:Fallback xmlns="">
           <p:pic>
             <p:nvPicPr>
               <p:cNvPr id="14" name="Ink 13">
@@ -13988,8 +13988,8 @@
           </p:pic>
         </mc:Fallback>
       </mc:AlternateContent>
-      <mc:AlternateContent xmlns:mc="http://schemas.openxmlformats.org/markup-compatibility/2006">
-        <mc:Choice xmlns:p14="http://schemas.microsoft.com/office/powerpoint/2010/main" Requires="p14">
+      <mc:AlternateContent xmlns:mc="http://schemas.openxmlformats.org/markup-compatibility/2006" xmlns:p14="http://schemas.microsoft.com/office/powerpoint/2010/main">
+        <mc:Choice Requires="p14">
           <p:contentPart p14:bwMode="auto" r:id="rId67">
             <p14:nvContentPartPr>
               <p14:cNvPr id="69" name="Ink 68">
@@ -14008,7 +14008,7 @@
             </p14:xfrm>
           </p:contentPart>
         </mc:Choice>
-        <mc:Fallback>
+        <mc:Fallback xmlns="">
           <p:pic>
             <p:nvPicPr>
               <p:cNvPr id="69" name="Ink 68">
@@ -14039,8 +14039,8 @@
           </p:pic>
         </mc:Fallback>
       </mc:AlternateContent>
-      <mc:AlternateContent xmlns:mc="http://schemas.openxmlformats.org/markup-compatibility/2006">
-        <mc:Choice xmlns:p14="http://schemas.microsoft.com/office/powerpoint/2010/main" Requires="p14">
+      <mc:AlternateContent xmlns:mc="http://schemas.openxmlformats.org/markup-compatibility/2006" xmlns:p14="http://schemas.microsoft.com/office/powerpoint/2010/main">
+        <mc:Choice Requires="p14">
           <p:contentPart p14:bwMode="auto" r:id="rId69">
             <p14:nvContentPartPr>
               <p14:cNvPr id="78" name="Ink 77">
@@ -14059,7 +14059,7 @@
             </p14:xfrm>
           </p:contentPart>
         </mc:Choice>
-        <mc:Fallback>
+        <mc:Fallback xmlns="">
           <p:pic>
             <p:nvPicPr>
               <p:cNvPr id="78" name="Ink 77">
@@ -14090,8 +14090,8 @@
           </p:pic>
         </mc:Fallback>
       </mc:AlternateContent>
-      <mc:AlternateContent xmlns:mc="http://schemas.openxmlformats.org/markup-compatibility/2006">
-        <mc:Choice xmlns:p14="http://schemas.microsoft.com/office/powerpoint/2010/main" Requires="p14">
+      <mc:AlternateContent xmlns:mc="http://schemas.openxmlformats.org/markup-compatibility/2006" xmlns:p14="http://schemas.microsoft.com/office/powerpoint/2010/main">
+        <mc:Choice Requires="p14">
           <p:contentPart p14:bwMode="auto" r:id="rId70">
             <p14:nvContentPartPr>
               <p14:cNvPr id="79" name="Ink 78">
@@ -14110,7 +14110,7 @@
             </p14:xfrm>
           </p:contentPart>
         </mc:Choice>
-        <mc:Fallback>
+        <mc:Fallback xmlns="">
           <p:pic>
             <p:nvPicPr>
               <p:cNvPr id="79" name="Ink 78">
@@ -14206,7 +14206,7 @@
           <a:effectLst/>
           <a:extLst>
             <a:ext uri="{AF507438-7753-43e0-B8FC-AC1667EBCBE1}">
-              <a14:hiddenEffects xmlns:a14="http://schemas.microsoft.com/office/drawing/2010/main" xmlns="">
+              <a14:hiddenEffects xmlns="" xmlns:a14="http://schemas.microsoft.com/office/drawing/2010/main">
                 <a:effectLst>
                   <a:outerShdw blurRad="63500" dist="38099" dir="2700000" algn="ctr" rotWithShape="0">
                     <a:schemeClr val="bg2">

</xml_diff>